<commit_message>
Update Prezentacja etap 1 TAIIB V1.pptx
</commit_message>
<xml_diff>
--- a/Docs/Prezentacja etap 1 TAIIB V1.pptx
+++ b/Docs/Prezentacja etap 1 TAIIB V1.pptx
@@ -6592,19 +6592,21 @@
               </a:buClr>
             </a:pPr>
             <a:r>
-              <a:rPr lang="pl-PL" sz="1400">
+              <a:rPr lang="pl-PL" sz="1400" dirty="0">
                 <a:solidFill>
                   <a:srgbClr val="ECECEC"/>
                 </a:solidFill>
+                <a:latin typeface="Aptos" panose="020B0004020202020204" pitchFamily="34" charset="0"/>
                 <a:ea typeface="+mn-lt"/>
                 <a:cs typeface="+mn-lt"/>
               </a:rPr>
               <a:t>Przeglądanie dostępnych połączeń lotniczych.</a:t>
             </a:r>
-            <a:endParaRPr lang="pl-PL" sz="1400">
+            <a:endParaRPr lang="pl-PL" sz="1400" dirty="0">
               <a:solidFill>
                 <a:srgbClr val="ECECEC"/>
               </a:solidFill>
+              <a:latin typeface="Aptos" panose="020B0004020202020204" pitchFamily="34" charset="0"/>
               <a:ea typeface="Calibri" panose="020F0502020204030204"/>
               <a:cs typeface="Calibri" panose="020F0502020204030204"/>
             </a:endParaRPr>
@@ -6616,10 +6618,11 @@
               </a:buClr>
             </a:pPr>
             <a:r>
-              <a:rPr lang="pl-PL" sz="1400">
+              <a:rPr lang="pl-PL" sz="1400" dirty="0">
                 <a:solidFill>
                   <a:srgbClr val="ECECEC"/>
                 </a:solidFill>
+                <a:latin typeface="Aptos" panose="020B0004020202020204" pitchFamily="34" charset="0"/>
                 <a:ea typeface="+mn-lt"/>
                 <a:cs typeface="+mn-lt"/>
               </a:rPr>
@@ -6633,10 +6636,11 @@
               </a:buClr>
             </a:pPr>
             <a:r>
-              <a:rPr lang="pl-PL" sz="1400">
+              <a:rPr lang="pl-PL" sz="1400" dirty="0">
                 <a:solidFill>
                   <a:srgbClr val="ECECEC"/>
                 </a:solidFill>
+                <a:latin typeface="Aptos" panose="020B0004020202020204" pitchFamily="34" charset="0"/>
                 <a:ea typeface="+mn-lt"/>
                 <a:cs typeface="+mn-lt"/>
               </a:rPr>
@@ -6650,10 +6654,11 @@
               </a:buClr>
             </a:pPr>
             <a:r>
-              <a:rPr lang="pl-PL" sz="1400">
+              <a:rPr lang="pl-PL" sz="1400" dirty="0">
                 <a:solidFill>
                   <a:srgbClr val="ECECEC"/>
                 </a:solidFill>
+                <a:latin typeface="Aptos" panose="020B0004020202020204" pitchFamily="34" charset="0"/>
                 <a:ea typeface="+mn-lt"/>
                 <a:cs typeface="+mn-lt"/>
               </a:rPr>
@@ -6667,16 +6672,18 @@
               </a:buClr>
             </a:pPr>
             <a:r>
-              <a:rPr lang="pl-PL" sz="1400">
+              <a:rPr lang="pl-PL" sz="1400" dirty="0">
                 <a:solidFill>
                   <a:srgbClr val="ECECEC"/>
                 </a:solidFill>
+                <a:latin typeface="Aptos" panose="020B0004020202020204" pitchFamily="34" charset="0"/>
                 <a:ea typeface="+mn-lt"/>
                 <a:cs typeface="+mn-lt"/>
               </a:rPr>
               <a:t>Zakup biletów na wybrany lot.</a:t>
             </a:r>
-            <a:endParaRPr lang="pl-PL" sz="1400">
+            <a:endParaRPr lang="pl-PL" sz="1400" dirty="0">
+              <a:latin typeface="Aptos" panose="020B0004020202020204" pitchFamily="34" charset="0"/>
               <a:ea typeface="Calibri" panose="020F0502020204030204"/>
               <a:cs typeface="Calibri" panose="020F0502020204030204"/>
             </a:endParaRPr>
@@ -6688,16 +6695,18 @@
               </a:buClr>
             </a:pPr>
             <a:r>
-              <a:rPr lang="pl-PL" sz="1400">
+              <a:rPr lang="pl-PL" sz="1400" dirty="0">
                 <a:solidFill>
                   <a:srgbClr val="ECECEC"/>
                 </a:solidFill>
+                <a:latin typeface="Aptos" panose="020B0004020202020204" pitchFamily="34" charset="0"/>
                 <a:ea typeface="+mn-lt"/>
                 <a:cs typeface="+mn-lt"/>
               </a:rPr>
               <a:t>Personalizacja biletu poprzez dodatkowe usługi, np. przewóz dodatkowego bagażu.</a:t>
             </a:r>
-            <a:endParaRPr lang="pl-PL" sz="1400">
+            <a:endParaRPr lang="pl-PL" sz="1400" dirty="0">
+              <a:latin typeface="Aptos" panose="020B0004020202020204" pitchFamily="34" charset="0"/>
               <a:ea typeface="Calibri" panose="020F0502020204030204"/>
               <a:cs typeface="Calibri" panose="020F0502020204030204"/>
             </a:endParaRPr>
@@ -6709,16 +6718,18 @@
               </a:buClr>
             </a:pPr>
             <a:r>
-              <a:rPr lang="pl-PL" sz="1400">
+              <a:rPr lang="pl-PL" sz="1400" dirty="0">
                 <a:solidFill>
                   <a:srgbClr val="ECECEC"/>
                 </a:solidFill>
+                <a:latin typeface="Aptos" panose="020B0004020202020204" pitchFamily="34" charset="0"/>
                 <a:ea typeface="+mn-lt"/>
                 <a:cs typeface="+mn-lt"/>
               </a:rPr>
               <a:t>Przeglądanie historii zakupionych biletów.</a:t>
             </a:r>
-            <a:endParaRPr lang="pl-PL" sz="1400">
+            <a:endParaRPr lang="pl-PL" sz="1400" dirty="0">
+              <a:latin typeface="Aptos" panose="020B0004020202020204" pitchFamily="34" charset="0"/>
               <a:ea typeface="Calibri" panose="020F0502020204030204"/>
               <a:cs typeface="Calibri" panose="020F0502020204030204"/>
             </a:endParaRPr>
@@ -6730,16 +6741,18 @@
               </a:buClr>
             </a:pPr>
             <a:r>
-              <a:rPr lang="pl-PL" sz="1400">
+              <a:rPr lang="pl-PL" sz="1400" dirty="0">
                 <a:solidFill>
                   <a:srgbClr val="ECECEC"/>
                 </a:solidFill>
+                <a:latin typeface="Aptos" panose="020B0004020202020204" pitchFamily="34" charset="0"/>
                 <a:ea typeface="+mn-lt"/>
                 <a:cs typeface="+mn-lt"/>
               </a:rPr>
               <a:t>Zarządzanie danymi lotów, w tym dodawanie, edycja i usuwanie informacji.</a:t>
             </a:r>
-            <a:endParaRPr lang="pl-PL" sz="1400">
+            <a:endParaRPr lang="pl-PL" sz="1400" dirty="0">
+              <a:latin typeface="Aptos" panose="020B0004020202020204" pitchFamily="34" charset="0"/>
               <a:ea typeface="Calibri" panose="020F0502020204030204"/>
               <a:cs typeface="Calibri" panose="020F0502020204030204"/>
             </a:endParaRPr>
@@ -6751,16 +6764,18 @@
               </a:buClr>
             </a:pPr>
             <a:r>
-              <a:rPr lang="pl-PL" sz="1400">
+              <a:rPr lang="pl-PL" sz="1400" dirty="0">
                 <a:solidFill>
                   <a:srgbClr val="ECECEC"/>
                 </a:solidFill>
+                <a:latin typeface="Aptos" panose="020B0004020202020204" pitchFamily="34" charset="0"/>
                 <a:ea typeface="+mn-lt"/>
                 <a:cs typeface="+mn-lt"/>
               </a:rPr>
               <a:t>Przegląd pasażerów zarejestrowanych na dany lot.</a:t>
             </a:r>
-            <a:endParaRPr lang="pl-PL" sz="1400">
+            <a:endParaRPr lang="pl-PL" sz="1400" dirty="0">
+              <a:latin typeface="Aptos" panose="020B0004020202020204" pitchFamily="34" charset="0"/>
               <a:ea typeface="Calibri" panose="020F0502020204030204"/>
               <a:cs typeface="Calibri" panose="020F0502020204030204"/>
             </a:endParaRPr>
@@ -6772,16 +6787,18 @@
               </a:buClr>
             </a:pPr>
             <a:r>
-              <a:rPr lang="pl-PL" sz="1400">
+              <a:rPr lang="pl-PL" sz="1400" dirty="0">
                 <a:solidFill>
                   <a:srgbClr val="ECECEC"/>
                 </a:solidFill>
+                <a:latin typeface="Aptos" panose="020B0004020202020204" pitchFamily="34" charset="0"/>
                 <a:ea typeface="+mn-lt"/>
                 <a:cs typeface="+mn-lt"/>
               </a:rPr>
               <a:t>Potwierdzanie i odwoływanie lotów.</a:t>
             </a:r>
-            <a:endParaRPr lang="pl-PL" sz="1400">
+            <a:endParaRPr lang="pl-PL" sz="1400" dirty="0">
+              <a:latin typeface="Aptos" panose="020B0004020202020204" pitchFamily="34" charset="0"/>
               <a:ea typeface="Calibri" panose="020F0502020204030204"/>
               <a:cs typeface="Calibri" panose="020F0502020204030204"/>
             </a:endParaRPr>
@@ -6793,16 +6810,18 @@
               </a:buClr>
             </a:pPr>
             <a:r>
-              <a:rPr lang="pl-PL" sz="1400">
+              <a:rPr lang="pl-PL" sz="1400" dirty="0">
                 <a:solidFill>
                   <a:srgbClr val="ECECEC"/>
                 </a:solidFill>
+                <a:latin typeface="Aptos" panose="020B0004020202020204" pitchFamily="34" charset="0"/>
                 <a:ea typeface="+mn-lt"/>
                 <a:cs typeface="+mn-lt"/>
               </a:rPr>
               <a:t>Przegląd historii lotów danego samolotu.</a:t>
             </a:r>
-            <a:endParaRPr lang="pl-PL" sz="1400">
+            <a:endParaRPr lang="pl-PL" sz="1400" dirty="0">
+              <a:latin typeface="Aptos" panose="020B0004020202020204" pitchFamily="34" charset="0"/>
               <a:ea typeface="Calibri" panose="020F0502020204030204"/>
               <a:cs typeface="Calibri" panose="020F0502020204030204"/>
             </a:endParaRPr>
@@ -6814,6 +6833,7 @@
               </a:buClr>
             </a:pPr>
             <a:endParaRPr lang="pl-PL" dirty="0">
+              <a:latin typeface="Aptos" panose="020B0004020202020204" pitchFamily="34" charset="0"/>
               <a:ea typeface="Calibri" panose="020F0502020204030204"/>
               <a:cs typeface="Calibri" panose="020F0502020204030204"/>
             </a:endParaRPr>
@@ -6823,6 +6843,7 @@
               <a:buNone/>
             </a:pPr>
             <a:endParaRPr lang="pl-PL" dirty="0">
+              <a:latin typeface="Aptos" panose="020B0004020202020204" pitchFamily="34" charset="0"/>
               <a:ea typeface="Calibri" panose="020F0502020204030204"/>
               <a:cs typeface="Calibri" panose="020F0502020204030204"/>
             </a:endParaRPr>

</xml_diff>